<commit_message>
Updates and fixed #355
</commit_message>
<xml_diff>
--- a/plugfest/2017-burlingame/CollectionServientInfo2017.pptx
+++ b/plugfest/2017-burlingame/CollectionServientInfo2017.pptx
@@ -114,7 +114,7 @@
   </p:defaultTextStyle>
   <p:extLst>
     <p:ext uri="{EFAFB233-063F-42B5-8137-9DF3F51BA10A}">
-      <p15:sldGuideLst xmlns:p15="http://schemas.microsoft.com/office/powerpoint/2012/main" xmlns="">
+      <p15:sldGuideLst xmlns="" xmlns:p15="http://schemas.microsoft.com/office/powerpoint/2012/main">
         <p15:guide id="1" orient="horz" pos="2160">
           <p15:clr>
             <a:srgbClr val="A4A3A4"/>
@@ -415,7 +415,7 @@
     </p:spTree>
     <p:extLst>
       <p:ext uri="{BB962C8B-B14F-4D97-AF65-F5344CB8AC3E}">
-        <p14:creationId xmlns:p14="http://schemas.microsoft.com/office/powerpoint/2010/main" xmlns="" val="2524674485"/>
+        <p14:creationId xmlns="" xmlns:p14="http://schemas.microsoft.com/office/powerpoint/2010/main" val="2524674485"/>
       </p:ext>
     </p:extLst>
   </p:cSld>
@@ -590,7 +590,7 @@
     </p:spTree>
     <p:extLst>
       <p:ext uri="{BB962C8B-B14F-4D97-AF65-F5344CB8AC3E}">
-        <p14:creationId xmlns:p14="http://schemas.microsoft.com/office/powerpoint/2010/main" xmlns="" val="4228256280"/>
+        <p14:creationId xmlns="" xmlns:p14="http://schemas.microsoft.com/office/powerpoint/2010/main" val="4228256280"/>
       </p:ext>
     </p:extLst>
   </p:cSld>
@@ -675,7 +675,7 @@
     </p:spTree>
     <p:extLst>
       <p:ext uri="{BB962C8B-B14F-4D97-AF65-F5344CB8AC3E}">
-        <p14:creationId xmlns:p14="http://schemas.microsoft.com/office/powerpoint/2010/main" xmlns="" val="4228256280"/>
+        <p14:creationId xmlns="" xmlns:p14="http://schemas.microsoft.com/office/powerpoint/2010/main" val="4228256280"/>
       </p:ext>
     </p:extLst>
   </p:cSld>
@@ -873,7 +873,7 @@
     </p:spTree>
     <p:extLst>
       <p:ext uri="{BB962C8B-B14F-4D97-AF65-F5344CB8AC3E}">
-        <p14:creationId xmlns:p14="http://schemas.microsoft.com/office/powerpoint/2010/main" xmlns="" val="3230947085"/>
+        <p14:creationId xmlns="" xmlns:p14="http://schemas.microsoft.com/office/powerpoint/2010/main" val="3230947085"/>
       </p:ext>
     </p:extLst>
   </p:cSld>
@@ -1081,7 +1081,7 @@
     </p:spTree>
     <p:extLst>
       <p:ext uri="{BB962C8B-B14F-4D97-AF65-F5344CB8AC3E}">
-        <p14:creationId xmlns:p14="http://schemas.microsoft.com/office/powerpoint/2010/main" xmlns="" val="3721398776"/>
+        <p14:creationId xmlns="" xmlns:p14="http://schemas.microsoft.com/office/powerpoint/2010/main" val="3721398776"/>
       </p:ext>
     </p:extLst>
   </p:cSld>
@@ -1299,7 +1299,7 @@
     </p:spTree>
     <p:extLst>
       <p:ext uri="{BB962C8B-B14F-4D97-AF65-F5344CB8AC3E}">
-        <p14:creationId xmlns:p14="http://schemas.microsoft.com/office/powerpoint/2010/main" xmlns="" val="4162209232"/>
+        <p14:creationId xmlns="" xmlns:p14="http://schemas.microsoft.com/office/powerpoint/2010/main" val="4162209232"/>
       </p:ext>
     </p:extLst>
   </p:cSld>
@@ -1507,7 +1507,7 @@
     </p:spTree>
     <p:extLst>
       <p:ext uri="{BB962C8B-B14F-4D97-AF65-F5344CB8AC3E}">
-        <p14:creationId xmlns:p14="http://schemas.microsoft.com/office/powerpoint/2010/main" xmlns="" val="653271255"/>
+        <p14:creationId xmlns="" xmlns:p14="http://schemas.microsoft.com/office/powerpoint/2010/main" val="653271255"/>
       </p:ext>
     </p:extLst>
   </p:cSld>
@@ -1757,7 +1757,7 @@
     </p:spTree>
     <p:extLst>
       <p:ext uri="{BB962C8B-B14F-4D97-AF65-F5344CB8AC3E}">
-        <p14:creationId xmlns:p14="http://schemas.microsoft.com/office/powerpoint/2010/main" xmlns="" val="2275173618"/>
+        <p14:creationId xmlns="" xmlns:p14="http://schemas.microsoft.com/office/powerpoint/2010/main" val="2275173618"/>
       </p:ext>
     </p:extLst>
   </p:cSld>
@@ -2059,7 +2059,7 @@
     </p:spTree>
     <p:extLst>
       <p:ext uri="{BB962C8B-B14F-4D97-AF65-F5344CB8AC3E}">
-        <p14:creationId xmlns:p14="http://schemas.microsoft.com/office/powerpoint/2010/main" xmlns="" val="2027829850"/>
+        <p14:creationId xmlns="" xmlns:p14="http://schemas.microsoft.com/office/powerpoint/2010/main" val="2027829850"/>
       </p:ext>
     </p:extLst>
   </p:cSld>
@@ -2496,7 +2496,7 @@
     </p:spTree>
     <p:extLst>
       <p:ext uri="{BB962C8B-B14F-4D97-AF65-F5344CB8AC3E}">
-        <p14:creationId xmlns:p14="http://schemas.microsoft.com/office/powerpoint/2010/main" xmlns="" val="1017946402"/>
+        <p14:creationId xmlns="" xmlns:p14="http://schemas.microsoft.com/office/powerpoint/2010/main" val="1017946402"/>
       </p:ext>
     </p:extLst>
   </p:cSld>
@@ -2620,7 +2620,7 @@
     </p:spTree>
     <p:extLst>
       <p:ext uri="{BB962C8B-B14F-4D97-AF65-F5344CB8AC3E}">
-        <p14:creationId xmlns:p14="http://schemas.microsoft.com/office/powerpoint/2010/main" xmlns="" val="2650824431"/>
+        <p14:creationId xmlns="" xmlns:p14="http://schemas.microsoft.com/office/powerpoint/2010/main" val="2650824431"/>
       </p:ext>
     </p:extLst>
   </p:cSld>
@@ -2721,7 +2721,7 @@
     </p:spTree>
     <p:extLst>
       <p:ext uri="{BB962C8B-B14F-4D97-AF65-F5344CB8AC3E}">
-        <p14:creationId xmlns:p14="http://schemas.microsoft.com/office/powerpoint/2010/main" xmlns="" val="1424695028"/>
+        <p14:creationId xmlns="" xmlns:p14="http://schemas.microsoft.com/office/powerpoint/2010/main" val="1424695028"/>
       </p:ext>
     </p:extLst>
   </p:cSld>
@@ -3036,7 +3036,7 @@
     </p:spTree>
     <p:extLst>
       <p:ext uri="{BB962C8B-B14F-4D97-AF65-F5344CB8AC3E}">
-        <p14:creationId xmlns:p14="http://schemas.microsoft.com/office/powerpoint/2010/main" xmlns="" val="922144286"/>
+        <p14:creationId xmlns="" xmlns:p14="http://schemas.microsoft.com/office/powerpoint/2010/main" val="922144286"/>
       </p:ext>
     </p:extLst>
   </p:cSld>
@@ -3299,7 +3299,7 @@
     </p:spTree>
     <p:extLst>
       <p:ext uri="{BB962C8B-B14F-4D97-AF65-F5344CB8AC3E}">
-        <p14:creationId xmlns:p14="http://schemas.microsoft.com/office/powerpoint/2010/main" xmlns="" val="3131589639"/>
+        <p14:creationId xmlns="" xmlns:p14="http://schemas.microsoft.com/office/powerpoint/2010/main" val="3131589639"/>
       </p:ext>
     </p:extLst>
   </p:cSld>
@@ -3586,7 +3586,7 @@
     </p:spTree>
     <p:extLst>
       <p:ext uri="{BB962C8B-B14F-4D97-AF65-F5344CB8AC3E}">
-        <p14:creationId xmlns:p14="http://schemas.microsoft.com/office/powerpoint/2010/main" xmlns="" val="1653567156"/>
+        <p14:creationId xmlns="" xmlns:p14="http://schemas.microsoft.com/office/powerpoint/2010/main" val="1653567156"/>
       </p:ext>
     </p:extLst>
   </p:cSld>
@@ -5699,7 +5699,15 @@
             <a:pPr algn="ctr"/>
             <a:r>
               <a:rPr lang="en-US" altLang="ja-JP" sz="800" dirty="0" smtClean="0"/>
-              <a:t>(EUROCOM)</a:t>
+              <a:t>(</a:t>
+            </a:r>
+            <a:r>
+              <a:rPr lang="en-US" altLang="ja-JP" sz="800" dirty="0" smtClean="0"/>
+              <a:t>EURECOM</a:t>
+            </a:r>
+            <a:r>
+              <a:rPr lang="en-US" altLang="ja-JP" sz="800" dirty="0" smtClean="0"/>
+              <a:t>)</a:t>
             </a:r>
           </a:p>
         </p:txBody>
@@ -6639,7 +6647,7 @@
     </p:spTree>
     <p:extLst>
       <p:ext uri="{BB962C8B-B14F-4D97-AF65-F5344CB8AC3E}">
-        <p14:creationId xmlns:p14="http://schemas.microsoft.com/office/powerpoint/2010/main" xmlns="" val="4033359331"/>
+        <p14:creationId xmlns="" xmlns:p14="http://schemas.microsoft.com/office/powerpoint/2010/main" val="4033359331"/>
       </p:ext>
     </p:extLst>
   </p:cSld>
@@ -6717,15 +6725,7 @@
             <a:pPr algn="ctr"/>
             <a:r>
               <a:rPr kumimoji="1" lang="en-US" altLang="ja-JP" sz="800" smtClean="0"/>
-              <a:t>(</a:t>
-            </a:r>
-            <a:r>
-              <a:rPr kumimoji="1" lang="en-US" altLang="ja-JP" sz="800" smtClean="0"/>
-              <a:t>Panasonic</a:t>
-            </a:r>
-            <a:r>
-              <a:rPr kumimoji="1" lang="en-US" altLang="ja-JP" sz="800" smtClean="0"/>
-              <a:t>)</a:t>
+              <a:t>(Panasonic)</a:t>
             </a:r>
             <a:endParaRPr kumimoji="1" lang="en-US" altLang="ja-JP" sz="800"/>
           </a:p>
@@ -6774,15 +6774,7 @@
             <a:pPr algn="ctr"/>
             <a:r>
               <a:rPr kumimoji="1" lang="en-US" altLang="ja-JP" sz="800" smtClean="0"/>
-              <a:t>(</a:t>
-            </a:r>
-            <a:r>
-              <a:rPr kumimoji="1" lang="en-US" altLang="ja-JP" sz="800" smtClean="0"/>
-              <a:t>Panasonic</a:t>
-            </a:r>
-            <a:r>
-              <a:rPr kumimoji="1" lang="en-US" altLang="ja-JP" sz="800" smtClean="0"/>
-              <a:t>)</a:t>
+              <a:t>(Panasonic)</a:t>
             </a:r>
             <a:endParaRPr kumimoji="1" lang="en-US" altLang="ja-JP" sz="800"/>
           </a:p>
@@ -6831,15 +6823,7 @@
             <a:pPr algn="ctr"/>
             <a:r>
               <a:rPr kumimoji="1" lang="en-US" altLang="ja-JP" sz="800" smtClean="0"/>
-              <a:t>(</a:t>
-            </a:r>
-            <a:r>
-              <a:rPr kumimoji="1" lang="en-US" altLang="ja-JP" sz="800" smtClean="0"/>
-              <a:t>Panasonic</a:t>
-            </a:r>
-            <a:r>
-              <a:rPr kumimoji="1" lang="en-US" altLang="ja-JP" sz="800" smtClean="0"/>
-              <a:t>)</a:t>
+              <a:t>(Panasonic)</a:t>
             </a:r>
             <a:endParaRPr kumimoji="1" lang="en-US" altLang="ja-JP" sz="800"/>
           </a:p>
@@ -6881,11 +6865,7 @@
             <a:pPr algn="ctr"/>
             <a:r>
               <a:rPr lang="en-US" altLang="ja-JP" sz="800" smtClean="0"/>
-              <a:t>Device </a:t>
-            </a:r>
-            <a:r>
-              <a:rPr lang="en-US" altLang="ja-JP" sz="800" smtClean="0"/>
-              <a:t>Servient</a:t>
+              <a:t>Device Servient</a:t>
             </a:r>
             <a:br>
               <a:rPr lang="en-US" altLang="ja-JP" sz="800" smtClean="0"/>
@@ -6894,21 +6874,12 @@
               <a:rPr lang="en-US" altLang="ja-JP" sz="800" smtClean="0"/>
               <a:t>Festo Plant</a:t>
             </a:r>
-            <a:endParaRPr lang="en-US" altLang="ja-JP" sz="800" smtClean="0"/>
           </a:p>
           <a:p>
             <a:pPr algn="ctr"/>
             <a:r>
               <a:rPr kumimoji="1" lang="en-US" altLang="ja-JP" sz="800" smtClean="0"/>
-              <a:t>(</a:t>
-            </a:r>
-            <a:r>
-              <a:rPr kumimoji="1" lang="en-US" altLang="ja-JP" sz="800" smtClean="0"/>
-              <a:t>Siemens</a:t>
-            </a:r>
-            <a:r>
-              <a:rPr kumimoji="1" lang="en-US" altLang="ja-JP" sz="800" smtClean="0"/>
-              <a:t>)</a:t>
+              <a:t>(Siemens)</a:t>
             </a:r>
             <a:endParaRPr kumimoji="1" lang="en-US" altLang="ja-JP" sz="800"/>
           </a:p>
@@ -7006,15 +6977,7 @@
             <a:pPr algn="ctr"/>
             <a:r>
               <a:rPr kumimoji="1" lang="en-US" altLang="ja-JP" sz="800" smtClean="0"/>
-              <a:t>(</a:t>
-            </a:r>
-            <a:r>
-              <a:rPr kumimoji="1" lang="en-US" altLang="ja-JP" sz="800" smtClean="0"/>
-              <a:t>Panasonic</a:t>
-            </a:r>
-            <a:r>
-              <a:rPr kumimoji="1" lang="en-US" altLang="ja-JP" sz="800" smtClean="0"/>
-              <a:t>)</a:t>
+              <a:t>(Panasonic)</a:t>
             </a:r>
             <a:endParaRPr kumimoji="1" lang="en-US" altLang="ja-JP" sz="800"/>
           </a:p>
@@ -7063,15 +7026,7 @@
             <a:pPr algn="ctr"/>
             <a:r>
               <a:rPr kumimoji="1" lang="en-US" altLang="ja-JP" sz="800" smtClean="0"/>
-              <a:t>(</a:t>
-            </a:r>
-            <a:r>
-              <a:rPr kumimoji="1" lang="en-US" altLang="ja-JP" sz="800" smtClean="0"/>
-              <a:t>Panasonic</a:t>
-            </a:r>
-            <a:r>
-              <a:rPr kumimoji="1" lang="en-US" altLang="ja-JP" sz="800" smtClean="0"/>
-              <a:t>)</a:t>
+              <a:t>(Panasonic)</a:t>
             </a:r>
             <a:endParaRPr kumimoji="1" lang="en-US" altLang="ja-JP" sz="800"/>
           </a:p>
@@ -7120,15 +7075,7 @@
             <a:pPr algn="ctr"/>
             <a:r>
               <a:rPr kumimoji="1" lang="en-US" altLang="ja-JP" sz="800" smtClean="0"/>
-              <a:t>(</a:t>
-            </a:r>
-            <a:r>
-              <a:rPr kumimoji="1" lang="en-US" altLang="ja-JP" sz="800" smtClean="0"/>
-              <a:t>Panasonic</a:t>
-            </a:r>
-            <a:r>
-              <a:rPr kumimoji="1" lang="en-US" altLang="ja-JP" sz="800" smtClean="0"/>
-              <a:t>)</a:t>
+              <a:t>(Panasonic)</a:t>
             </a:r>
             <a:endParaRPr kumimoji="1" lang="en-US" altLang="ja-JP" sz="800"/>
           </a:p>
@@ -7153,15 +7100,7 @@
           <a:p>
             <a:r>
               <a:rPr lang="en-US" altLang="ja-JP" sz="2000" smtClean="0"/>
-              <a:t>Servients from participants on </a:t>
-            </a:r>
-            <a:r>
-              <a:rPr lang="en-US" altLang="ja-JP" sz="2000" smtClean="0"/>
-              <a:t>TPAC2017 </a:t>
-            </a:r>
-            <a:r>
-              <a:rPr lang="en-US" altLang="ja-JP" sz="2000" smtClean="0"/>
-              <a:t>PlugFest</a:t>
+              <a:t>Servients from participants on TPAC2017 PlugFest</a:t>
             </a:r>
             <a:endParaRPr kumimoji="1" lang="en-US" altLang="ja-JP" sz="2000"/>
           </a:p>
@@ -7217,15 +7156,7 @@
             <a:pPr algn="ctr"/>
             <a:r>
               <a:rPr kumimoji="1" lang="en-US" altLang="ja-JP" sz="800" smtClean="0"/>
-              <a:t>(</a:t>
-            </a:r>
-            <a:r>
-              <a:rPr kumimoji="1" lang="en-US" altLang="ja-JP" sz="800" smtClean="0"/>
-              <a:t>Siemens</a:t>
-            </a:r>
-            <a:r>
-              <a:rPr kumimoji="1" lang="en-US" altLang="ja-JP" sz="800" smtClean="0"/>
-              <a:t>)</a:t>
+              <a:t>(Siemens)</a:t>
             </a:r>
             <a:endParaRPr kumimoji="1" lang="en-US" altLang="ja-JP" sz="800"/>
           </a:p>
@@ -7282,15 +7213,7 @@
             <a:pPr algn="ctr"/>
             <a:r>
               <a:rPr lang="en-US" altLang="ja-JP" sz="800" smtClean="0"/>
-              <a:t>(</a:t>
-            </a:r>
-            <a:r>
-              <a:rPr lang="en-US" altLang="ja-JP" sz="800" smtClean="0"/>
-              <a:t>Siemens</a:t>
-            </a:r>
-            <a:r>
-              <a:rPr lang="en-US" altLang="ja-JP" sz="800" smtClean="0"/>
-              <a:t>)</a:t>
+              <a:t>(Siemens)</a:t>
             </a:r>
             <a:endParaRPr kumimoji="1" lang="en-US" altLang="ja-JP" sz="800"/>
           </a:p>
@@ -7348,15 +7271,7 @@
             <a:pPr algn="ctr"/>
             <a:r>
               <a:rPr lang="en-US" altLang="ja-JP" sz="800" smtClean="0"/>
-              <a:t>(</a:t>
-            </a:r>
-            <a:r>
-              <a:rPr lang="en-US" altLang="ja-JP" sz="800" smtClean="0"/>
-              <a:t>Siemens</a:t>
-            </a:r>
-            <a:r>
-              <a:rPr lang="en-US" altLang="ja-JP" sz="800" smtClean="0"/>
-              <a:t>)</a:t>
+              <a:t>(Siemens)</a:t>
             </a:r>
             <a:endParaRPr kumimoji="1" lang="en-US" altLang="ja-JP" sz="800"/>
           </a:p>
@@ -7405,15 +7320,7 @@
             <a:pPr algn="ctr"/>
             <a:r>
               <a:rPr kumimoji="1" lang="en-US" altLang="ja-JP" sz="800" smtClean="0"/>
-              <a:t>(</a:t>
-            </a:r>
-            <a:r>
-              <a:rPr kumimoji="1" lang="en-US" altLang="ja-JP" sz="800" smtClean="0"/>
-              <a:t>Panasonic</a:t>
-            </a:r>
-            <a:r>
-              <a:rPr kumimoji="1" lang="en-US" altLang="ja-JP" sz="800" smtClean="0"/>
-              <a:t>)</a:t>
+              <a:t>(Panasonic)</a:t>
             </a:r>
             <a:endParaRPr kumimoji="1" lang="en-US" altLang="ja-JP" sz="800"/>
           </a:p>
@@ -7511,17 +7418,8 @@
             <a:pPr algn="ctr"/>
             <a:r>
               <a:rPr lang="en-US" altLang="ja-JP" sz="800" smtClean="0"/>
-              <a:t>Local </a:t>
-            </a:r>
-            <a:r>
-              <a:rPr lang="en-US" altLang="ja-JP" sz="800" smtClean="0"/>
-              <a:t>Proxy</a:t>
-            </a:r>
-            <a:r>
-              <a:rPr lang="en-US" altLang="ja-JP" sz="800" smtClean="0"/>
-              <a:t> Servient</a:t>
-            </a:r>
-            <a:endParaRPr lang="en-US" altLang="ja-JP" sz="800" smtClean="0"/>
+              <a:t>Local Proxy Servient</a:t>
+            </a:r>
           </a:p>
           <a:p>
             <a:pPr algn="ctr"/>
@@ -7630,17 +7528,8 @@
             <a:pPr algn="ctr"/>
             <a:r>
               <a:rPr lang="en-US" altLang="ja-JP" sz="800" smtClean="0"/>
-              <a:t>Local </a:t>
-            </a:r>
-            <a:r>
-              <a:rPr lang="en-US" altLang="ja-JP" sz="800" smtClean="0"/>
-              <a:t>Proxy</a:t>
-            </a:r>
-            <a:r>
-              <a:rPr lang="en-US" altLang="ja-JP" sz="800" smtClean="0"/>
-              <a:t> Servient</a:t>
-            </a:r>
-            <a:endParaRPr lang="en-US" altLang="ja-JP" sz="800" smtClean="0"/>
+              <a:t>Local Proxy Servient</a:t>
+            </a:r>
           </a:p>
           <a:p>
             <a:pPr algn="ctr"/>
@@ -7811,15 +7700,7 @@
             <a:pPr algn="ctr"/>
             <a:r>
               <a:rPr kumimoji="1" lang="en-US" altLang="ja-JP" sz="800" smtClean="0"/>
-              <a:t>(</a:t>
-            </a:r>
-            <a:r>
-              <a:rPr kumimoji="1" lang="en-US" altLang="ja-JP" sz="800" smtClean="0"/>
-              <a:t>Fujitsu</a:t>
-            </a:r>
-            <a:r>
-              <a:rPr kumimoji="1" lang="en-US" altLang="ja-JP" sz="800" smtClean="0"/>
-              <a:t>)</a:t>
+              <a:t>(Fujitsu)</a:t>
             </a:r>
             <a:endParaRPr kumimoji="1" lang="en-US" altLang="ja-JP" sz="800"/>
           </a:p>
@@ -8244,17 +8125,8 @@
             <a:pPr algn="ctr"/>
             <a:r>
               <a:rPr lang="en-US" altLang="ja-JP" sz="800" smtClean="0"/>
-              <a:t>Local </a:t>
-            </a:r>
-            <a:r>
-              <a:rPr lang="en-US" altLang="ja-JP" sz="800" smtClean="0"/>
-              <a:t>Proxy</a:t>
-            </a:r>
-            <a:r>
-              <a:rPr lang="en-US" altLang="ja-JP" sz="800" smtClean="0"/>
-              <a:t> Servient</a:t>
-            </a:r>
-            <a:endParaRPr lang="en-US" altLang="ja-JP" sz="800" smtClean="0"/>
+              <a:t>Local Proxy Servient</a:t>
+            </a:r>
           </a:p>
           <a:p>
             <a:pPr algn="ctr"/>
@@ -9179,11 +9051,7 @@
           <a:p>
             <a:r>
               <a:rPr lang="en-US" altLang="ja-JP" sz="1200" b="1" smtClean="0"/>
-              <a:t>Local </a:t>
-            </a:r>
-            <a:r>
-              <a:rPr lang="en-US" altLang="ja-JP" sz="1200" b="1" smtClean="0"/>
-              <a:t>network</a:t>
+              <a:t>Local network</a:t>
             </a:r>
             <a:endParaRPr kumimoji="1" lang="en-US" altLang="ja-JP" sz="1200" b="1"/>
           </a:p>
@@ -9213,15 +9081,7 @@
           <a:p>
             <a:r>
               <a:rPr lang="en-US" altLang="ja-JP" sz="1200" smtClean="0"/>
-              <a:t>Osaka</a:t>
-            </a:r>
-            <a:r>
-              <a:rPr lang="en-US" altLang="ja-JP" sz="1200" smtClean="0"/>
-              <a:t>, </a:t>
-            </a:r>
-            <a:r>
-              <a:rPr lang="en-US" altLang="ja-JP" sz="1200" smtClean="0"/>
-              <a:t>Japan</a:t>
+              <a:t>Osaka, Japan</a:t>
             </a:r>
             <a:endParaRPr kumimoji="1" lang="en-US" altLang="ja-JP" sz="1200"/>
           </a:p>
@@ -9251,15 +9111,7 @@
           <a:p>
             <a:r>
               <a:rPr lang="en-US" altLang="ja-JP" sz="1200" smtClean="0"/>
-              <a:t>Kanazawa</a:t>
-            </a:r>
-            <a:r>
-              <a:rPr lang="en-US" altLang="ja-JP" sz="1200" smtClean="0"/>
-              <a:t>, </a:t>
-            </a:r>
-            <a:r>
-              <a:rPr lang="en-US" altLang="ja-JP" sz="1200" smtClean="0"/>
-              <a:t>Japan</a:t>
+              <a:t>Kanazawa, Japan</a:t>
             </a:r>
             <a:endParaRPr kumimoji="1" lang="en-US" altLang="ja-JP" sz="1200"/>
           </a:p>
@@ -9578,23 +9430,7 @@
                   <a:srgbClr val="0070C0"/>
                 </a:solidFill>
               </a:rPr>
-              <a:t>NAT </a:t>
-            </a:r>
-            <a:r>
-              <a:rPr lang="en-US" altLang="ja-JP" sz="1050" smtClean="0">
-                <a:solidFill>
-                  <a:srgbClr val="0070C0"/>
-                </a:solidFill>
-              </a:rPr>
-              <a:t>/ </a:t>
-            </a:r>
-            <a:r>
-              <a:rPr lang="en-US" altLang="ja-JP" sz="1050" smtClean="0">
-                <a:solidFill>
-                  <a:srgbClr val="0070C0"/>
-                </a:solidFill>
-              </a:rPr>
-              <a:t>Firewall</a:t>
+              <a:t>NAT / Firewall</a:t>
             </a:r>
             <a:endParaRPr kumimoji="1" lang="en-US" altLang="ja-JP" sz="1050">
               <a:solidFill>
@@ -9726,11 +9562,7 @@
           <a:p>
             <a:r>
               <a:rPr lang="en-US" altLang="ja-JP" sz="1200" smtClean="0"/>
-              <a:t>San </a:t>
-            </a:r>
-            <a:r>
-              <a:rPr lang="en-US" altLang="ja-JP" sz="1200" smtClean="0"/>
-              <a:t>Francisco</a:t>
+              <a:t>San Francisco</a:t>
             </a:r>
             <a:endParaRPr kumimoji="1" lang="en-US" altLang="ja-JP" sz="1200"/>
           </a:p>
@@ -9900,15 +9732,7 @@
             <a:pPr algn="ctr"/>
             <a:r>
               <a:rPr lang="en-US" altLang="ja-JP" sz="1200" smtClean="0"/>
-              <a:t>Munich</a:t>
-            </a:r>
-            <a:r>
-              <a:rPr lang="en-US" altLang="ja-JP" sz="1200" smtClean="0"/>
-              <a:t>, </a:t>
-            </a:r>
-            <a:r>
-              <a:rPr lang="en-US" altLang="ja-JP" sz="1200" smtClean="0"/>
-              <a:t>Germany</a:t>
+              <a:t>Munich, Germany</a:t>
             </a:r>
             <a:endParaRPr kumimoji="1" lang="en-US" altLang="ja-JP" sz="1200"/>
           </a:p>
@@ -9960,7 +9784,6 @@
               <a:rPr lang="en-US" altLang="ja-JP" sz="800" smtClean="0"/>
               <a:t>WoT Client</a:t>
             </a:r>
-            <a:endParaRPr lang="en-US" altLang="ja-JP" sz="800" smtClean="0"/>
           </a:p>
           <a:p>
             <a:pPr algn="ctr"/>
@@ -10047,7 +9870,6 @@
               <a:rPr lang="en-US" altLang="ja-JP" sz="800" smtClean="0"/>
               <a:t>More local Applications?</a:t>
             </a:r>
-            <a:endParaRPr lang="en-US" altLang="ja-JP" sz="800" smtClean="0"/>
           </a:p>
         </p:txBody>
       </p:sp>
@@ -10095,7 +9917,6 @@
               <a:rPr lang="en-US" altLang="ja-JP" sz="800" smtClean="0"/>
               <a:t>More remote Applications?</a:t>
             </a:r>
-            <a:endParaRPr lang="en-US" altLang="ja-JP" sz="800" smtClean="0"/>
           </a:p>
         </p:txBody>
       </p:sp>
@@ -10180,7 +10001,7 @@
     </p:spTree>
     <p:extLst>
       <p:ext uri="{BB962C8B-B14F-4D97-AF65-F5344CB8AC3E}">
-        <p14:creationId xmlns:p14="http://schemas.microsoft.com/office/powerpoint/2010/main" xmlns="" val="4033359331"/>
+        <p14:creationId xmlns="" xmlns:p14="http://schemas.microsoft.com/office/powerpoint/2010/main" val="4033359331"/>
       </p:ext>
     </p:extLst>
   </p:cSld>
@@ -10251,7 +10072,7 @@
             <p:ph idx="1"/>
             <p:extLst>
               <p:ext uri="{D42A27DB-BD31-4B8C-83A1-F6EECF244321}">
-                <p14:modId xmlns:p14="http://schemas.microsoft.com/office/powerpoint/2010/main" xmlns="" val="1663462723"/>
+                <p14:modId xmlns="" xmlns:p14="http://schemas.microsoft.com/office/powerpoint/2010/main" val="1663462723"/>
               </p:ext>
             </p:extLst>
           </p:nvPr>
@@ -11493,7 +11314,7 @@
     </p:spTree>
     <p:extLst>
       <p:ext uri="{BB962C8B-B14F-4D97-AF65-F5344CB8AC3E}">
-        <p14:creationId xmlns:p14="http://schemas.microsoft.com/office/powerpoint/2010/main" xmlns="" val="778388246"/>
+        <p14:creationId xmlns="" xmlns:p14="http://schemas.microsoft.com/office/powerpoint/2010/main" val="778388246"/>
       </p:ext>
     </p:extLst>
   </p:cSld>
@@ -11565,7 +11386,7 @@
             <p:ph idx="1"/>
             <p:extLst>
               <p:ext uri="{D42A27DB-BD31-4B8C-83A1-F6EECF244321}">
-                <p14:modId xmlns:p14="http://schemas.microsoft.com/office/powerpoint/2010/main" xmlns="" val="3501308955"/>
+                <p14:modId xmlns="" xmlns:p14="http://schemas.microsoft.com/office/powerpoint/2010/main" val="3501308955"/>
               </p:ext>
             </p:extLst>
           </p:nvPr>
@@ -12171,7 +11992,7 @@
     </p:spTree>
     <p:extLst>
       <p:ext uri="{BB962C8B-B14F-4D97-AF65-F5344CB8AC3E}">
-        <p14:creationId xmlns:p14="http://schemas.microsoft.com/office/powerpoint/2010/main" xmlns="" val="1332708268"/>
+        <p14:creationId xmlns="" xmlns:p14="http://schemas.microsoft.com/office/powerpoint/2010/main" val="1332708268"/>
       </p:ext>
     </p:extLst>
   </p:cSld>
@@ -12417,7 +12238,7 @@
     </p:spTree>
     <p:extLst>
       <p:ext uri="{BB962C8B-B14F-4D97-AF65-F5344CB8AC3E}">
-        <p14:creationId xmlns:p14="http://schemas.microsoft.com/office/powerpoint/2010/main" xmlns="" val="207248980"/>
+        <p14:creationId xmlns="" xmlns:p14="http://schemas.microsoft.com/office/powerpoint/2010/main" val="207248980"/>
       </p:ext>
     </p:extLst>
   </p:cSld>
@@ -12647,7 +12468,7 @@
     </p:spTree>
     <p:extLst>
       <p:ext uri="{BB962C8B-B14F-4D97-AF65-F5344CB8AC3E}">
-        <p14:creationId xmlns:p14="http://schemas.microsoft.com/office/powerpoint/2010/main" xmlns="" val="548372940"/>
+        <p14:creationId xmlns="" xmlns:p14="http://schemas.microsoft.com/office/powerpoint/2010/main" val="548372940"/>
       </p:ext>
     </p:extLst>
   </p:cSld>
@@ -12912,7 +12733,7 @@
   <a:extraClrSchemeLst/>
   <a:extLst>
     <a:ext uri="{05A4C25C-085E-4340-85A3-A5531E510DB2}">
-      <thm15:themeFamily xmlns:thm15="http://schemas.microsoft.com/office/thememl/2012/main" xmlns="" name="Office Theme" id="{62F939B6-93AF-4DB8-9C6B-D6C7DFDC589F}" vid="{4A3C46E8-61CC-4603-A589-7422A47A8E4A}"/>
+      <thm15:themeFamily xmlns="" xmlns:thm15="http://schemas.microsoft.com/office/thememl/2012/main" name="Office Theme" id="{62F939B6-93AF-4DB8-9C6B-D6C7DFDC589F}" vid="{4A3C46E8-61CC-4603-A589-7422A47A8E4A}"/>
     </a:ext>
   </a:extLst>
 </a:theme>
@@ -13173,7 +12994,7 @@
   <a:extraClrSchemeLst/>
   <a:extLst>
     <a:ext uri="{05A4C25C-085E-4340-85A3-A5531E510DB2}">
-      <thm15:themeFamily xmlns:thm15="http://schemas.microsoft.com/office/thememl/2012/main" xmlns="" name="Office Theme" id="{62F939B6-93AF-4DB8-9C6B-D6C7DFDC589F}" vid="{4A3C46E8-61CC-4603-A589-7422A47A8E4A}"/>
+      <thm15:themeFamily xmlns="" xmlns:thm15="http://schemas.microsoft.com/office/thememl/2012/main" name="Office Theme" id="{62F939B6-93AF-4DB8-9C6B-D6C7DFDC589F}" vid="{4A3C46E8-61CC-4603-A589-7422A47A8E4A}"/>
     </a:ext>
   </a:extLst>
 </a:theme>

</xml_diff>